<commit_message>
updating slides for video recordings
</commit_message>
<xml_diff>
--- a/VideoSessionsMaterials/v5-getting-started.pptx
+++ b/VideoSessionsMaterials/v5-getting-started.pptx
@@ -5,14 +5,15 @@
     <p:sldMasterId id="2147483648" r:id="rId1"/>
   </p:sldMasterIdLst>
   <p:notesMasterIdLst>
-    <p:notesMasterId r:id="rId7"/>
+    <p:notesMasterId r:id="rId8"/>
   </p:notesMasterIdLst>
   <p:sldIdLst>
     <p:sldId id="270" r:id="rId2"/>
     <p:sldId id="271" r:id="rId3"/>
     <p:sldId id="272" r:id="rId4"/>
     <p:sldId id="273" r:id="rId5"/>
-    <p:sldId id="322" r:id="rId6"/>
+    <p:sldId id="323" r:id="rId6"/>
+    <p:sldId id="322" r:id="rId7"/>
   </p:sldIdLst>
   <p:sldSz cx="17327563" cy="9747250"/>
   <p:notesSz cx="6858000" cy="9144000"/>
@@ -227,7 +228,7 @@
             <a:fld id="{DDC063FE-8627-9A42-970F-0BBEEB02B587}" type="datetimeFigureOut">
               <a:rPr lang="en-US" smtClean="0"/>
               <a:pPr/>
-              <a:t>11/27/13</a:t>
+              <a:t>11/29/13</a:t>
             </a:fld>
             <a:endParaRPr lang="en-US" dirty="0"/>
           </a:p>
@@ -963,6 +964,117 @@
       </p:grpSpPr>
       <p:sp>
         <p:nvSpPr>
+          <p:cNvPr id="304129" name="Rectangle 7"/>
+          <p:cNvSpPr txBox="1">
+            <a:spLocks noGrp="1" noChangeArrowheads="1"/>
+          </p:cNvSpPr>
+          <p:nvPr/>
+        </p:nvSpPr>
+        <p:spPr bwMode="auto">
+          <a:xfrm>
+            <a:off x="3886200" y="8686489"/>
+            <a:ext cx="2971800" cy="457512"/>
+          </a:xfrm>
+          <a:prstGeom prst="rect">
+            <a:avLst/>
+          </a:prstGeom>
+          <a:noFill/>
+          <a:ln>
+            <a:miter lim="800000"/>
+            <a:headEnd/>
+            <a:tailEnd/>
+          </a:ln>
+        </p:spPr>
+        <p:txBody>
+          <a:bodyPr anchor="b"/>
+          <a:lstStyle/>
+          <a:p>
+            <a:pPr algn="r" eaLnBrk="0" hangingPunct="0">
+              <a:defRPr/>
+            </a:pPr>
+            <a:fld id="{5639B2D1-4F62-47BF-B141-83C0868A9AB5}" type="slidenum">
+              <a:rPr lang="en-US" sz="1200">
+                <a:ea typeface="ＭＳ Ｐゴシック" pitchFamily="34" charset="-128"/>
+                <a:cs typeface="+mn-cs"/>
+              </a:rPr>
+              <a:pPr algn="r" eaLnBrk="0" hangingPunct="0">
+                <a:defRPr/>
+              </a:pPr>
+              <a:t>5</a:t>
+            </a:fld>
+            <a:endParaRPr lang="en-US" sz="1200" dirty="0">
+              <a:ea typeface="ＭＳ Ｐゴシック" pitchFamily="34" charset="-128"/>
+              <a:cs typeface="+mn-cs"/>
+            </a:endParaRPr>
+          </a:p>
+        </p:txBody>
+      </p:sp>
+      <p:sp>
+        <p:nvSpPr>
+          <p:cNvPr id="97282" name="Rectangle 2"/>
+          <p:cNvSpPr>
+            <a:spLocks noGrp="1" noRot="1" noChangeAspect="1" noChangeArrowheads="1" noTextEdit="1"/>
+          </p:cNvSpPr>
+          <p:nvPr>
+            <p:ph type="sldImg"/>
+          </p:nvPr>
+        </p:nvSpPr>
+        <p:spPr>
+          <a:ln/>
+        </p:spPr>
+      </p:sp>
+      <p:sp>
+        <p:nvSpPr>
+          <p:cNvPr id="97283" name="Rectangle 3"/>
+          <p:cNvSpPr>
+            <a:spLocks noGrp="1" noChangeArrowheads="1"/>
+          </p:cNvSpPr>
+          <p:nvPr>
+            <p:ph type="body" idx="1"/>
+          </p:nvPr>
+        </p:nvSpPr>
+        <p:spPr>
+          <a:noFill/>
+          <a:ln/>
+        </p:spPr>
+        <p:txBody>
+          <a:bodyPr/>
+          <a:lstStyle/>
+          <a:p>
+            <a:pPr eaLnBrk="1" hangingPunct="1"/>
+            <a:endParaRPr lang="en-US" dirty="0" smtClean="0">
+              <a:ea typeface="ＭＳ Ｐゴシック"/>
+            </a:endParaRPr>
+          </a:p>
+        </p:txBody>
+      </p:sp>
+    </p:spTree>
+  </p:cSld>
+  <p:clrMapOvr>
+    <a:masterClrMapping/>
+  </p:clrMapOvr>
+</p:notes>
+</file>
+
+<file path=ppt/notesSlides/notesSlide6.xml><?xml version="1.0" encoding="utf-8"?>
+<p:notes xmlns:a="http://schemas.openxmlformats.org/drawingml/2006/main" xmlns:r="http://schemas.openxmlformats.org/officeDocument/2006/relationships" xmlns:p="http://schemas.openxmlformats.org/presentationml/2006/main">
+  <p:cSld>
+    <p:spTree>
+      <p:nvGrpSpPr>
+        <p:cNvPr id="1" name=""/>
+        <p:cNvGrpSpPr/>
+        <p:nvPr/>
+      </p:nvGrpSpPr>
+      <p:grpSpPr>
+        <a:xfrm>
+          <a:off x="0" y="0"/>
+          <a:ext cx="0" cy="0"/>
+          <a:chOff x="0" y="0"/>
+          <a:chExt cx="0" cy="0"/>
+        </a:xfrm>
+      </p:grpSpPr>
+      <p:sp>
+        <p:nvSpPr>
           <p:cNvPr id="2" name="Slide Image Placeholder 1"/>
           <p:cNvSpPr>
             <a:spLocks noGrp="1" noRot="1" noChangeAspect="1"/>
@@ -1010,7 +1122,7 @@
             <a:fld id="{3560C2FB-C494-1A46-A471-884A4E75440F}" type="slidenum">
               <a:rPr lang="en-US" smtClean="0"/>
               <a:pPr/>
-              <a:t>5</a:t>
+              <a:t>6</a:t>
             </a:fld>
             <a:endParaRPr lang="en-US" dirty="0"/>
           </a:p>
@@ -5336,16 +5448,11 @@
               <a:rPr lang="en-US" dirty="0" smtClean="0"/>
               <a:t>Getting Started with the </a:t>
             </a:r>
-            <a:endParaRPr lang="en-US" dirty="0" smtClean="0"/>
           </a:p>
           <a:p>
             <a:r>
               <a:rPr lang="en-US" dirty="0" smtClean="0"/>
-              <a:t>Smart </a:t>
-            </a:r>
-            <a:r>
-              <a:rPr lang="en-US" dirty="0" smtClean="0"/>
-              <a:t>Player API</a:t>
+              <a:t>Smart Player API</a:t>
             </a:r>
             <a:endParaRPr lang="en-US" dirty="0"/>
           </a:p>
@@ -5617,15 +5724,7 @@
                   <a:schemeClr val="tx1"/>
                 </a:solidFill>
               </a:rPr>
-              <a:t> </a:t>
-            </a:r>
-            <a:r>
-              <a:rPr lang="en-US" sz="3200" dirty="0" smtClean="0">
-                <a:solidFill>
-                  <a:schemeClr val="tx1"/>
-                </a:solidFill>
-              </a:rPr>
-              <a:t>and </a:t>
+              <a:t> and </a:t>
             </a:r>
             <a:r>
               <a:rPr lang="en-US" sz="3200" dirty="0" smtClean="0">
@@ -5643,15 +5742,7 @@
                   <a:schemeClr val="tx1"/>
                 </a:solidFill>
               </a:rPr>
-              <a:t> </a:t>
-            </a:r>
-            <a:r>
-              <a:rPr lang="en-US" sz="3200" dirty="0" smtClean="0">
-                <a:solidFill>
-                  <a:schemeClr val="tx1"/>
-                </a:solidFill>
-              </a:rPr>
-              <a:t>event listeners</a:t>
+              <a:t> event listeners</a:t>
             </a:r>
           </a:p>
           <a:p>
@@ -7003,6 +7094,128 @@
       </p:grpSpPr>
       <p:sp>
         <p:nvSpPr>
+          <p:cNvPr id="303106" name="Slide Number Placeholder 3"/>
+          <p:cNvSpPr txBox="1">
+            <a:spLocks noGrp="1"/>
+          </p:cNvSpPr>
+          <p:nvPr/>
+        </p:nvSpPr>
+        <p:spPr bwMode="auto">
+          <a:xfrm>
+            <a:off x="315868" y="9189943"/>
+            <a:ext cx="866378" cy="541514"/>
+          </a:xfrm>
+          <a:prstGeom prst="rect">
+            <a:avLst/>
+          </a:prstGeom>
+          <a:noFill/>
+          <a:ln>
+            <a:miter lim="800000"/>
+            <a:headEnd/>
+            <a:tailEnd/>
+          </a:ln>
+        </p:spPr>
+        <p:txBody>
+          <a:bodyPr lIns="154707" tIns="77354" rIns="154707" bIns="77354"/>
+          <a:lstStyle/>
+          <a:p>
+            <a:pPr eaLnBrk="0" hangingPunct="0">
+              <a:defRPr/>
+            </a:pPr>
+            <a:fld id="{1BD3BB7B-F997-4B7C-BCBE-A063D59C732E}" type="slidenum">
+              <a:rPr lang="en-US" sz="1500" b="1">
+                <a:solidFill>
+                  <a:srgbClr val="7B7B7B"/>
+                </a:solidFill>
+                <a:ea typeface="ＭＳ Ｐゴシック" pitchFamily="34" charset="-128"/>
+                <a:cs typeface="+mn-cs"/>
+              </a:rPr>
+              <a:pPr eaLnBrk="0" hangingPunct="0">
+                <a:defRPr/>
+              </a:pPr>
+              <a:t>5</a:t>
+            </a:fld>
+            <a:endParaRPr lang="en-US" sz="1500" b="1" dirty="0">
+              <a:solidFill>
+                <a:srgbClr val="7B7B7B"/>
+              </a:solidFill>
+              <a:ea typeface="ＭＳ Ｐゴシック" pitchFamily="34" charset="-128"/>
+              <a:cs typeface="+mn-cs"/>
+            </a:endParaRPr>
+          </a:p>
+        </p:txBody>
+      </p:sp>
+      <p:sp>
+        <p:nvSpPr>
+          <p:cNvPr id="5" name="Text Placeholder 4"/>
+          <p:cNvSpPr>
+            <a:spLocks noGrp="1"/>
+          </p:cNvSpPr>
+          <p:nvPr>
+            <p:ph type="body" sz="quarter" idx="10"/>
+          </p:nvPr>
+        </p:nvSpPr>
+        <p:spPr/>
+        <p:txBody>
+          <a:bodyPr/>
+          <a:lstStyle/>
+          <a:p>
+            <a:r>
+              <a:rPr lang="en-US" dirty="0" smtClean="0"/>
+              <a:t>Demo 1: </a:t>
+            </a:r>
+            <a:r>
+              <a:rPr lang="en-US" dirty="0" smtClean="0"/>
+              <a:t>Getting </a:t>
+            </a:r>
+            <a:r>
+              <a:rPr lang="en-US" dirty="0" smtClean="0"/>
+              <a:t>Started with the Smart Player API</a:t>
+            </a:r>
+            <a:endParaRPr lang="en-US" dirty="0" smtClean="0"/>
+          </a:p>
+        </p:txBody>
+      </p:sp>
+    </p:spTree>
+    <p:extLst>
+      <p:ext uri="{BB962C8B-B14F-4D97-AF65-F5344CB8AC3E}">
+        <p14:creationId xmlns:p14="http://schemas.microsoft.com/office/powerpoint/2010/main" val="1615389648"/>
+      </p:ext>
+    </p:extLst>
+  </p:cSld>
+  <p:clrMapOvr>
+    <a:masterClrMapping/>
+  </p:clrMapOvr>
+  <p:transition xmlns:p14="http://schemas.microsoft.com/office/powerpoint/2010/main"/>
+  <p:timing>
+    <p:tnLst>
+      <p:par>
+        <p:cTn xmlns:p14="http://schemas.microsoft.com/office/powerpoint/2010/main" id="1" dur="indefinite" restart="never" nodeType="tmRoot"/>
+      </p:par>
+    </p:tnLst>
+  </p:timing>
+</p:sld>
+</file>
+
+<file path=ppt/slides/slide6.xml><?xml version="1.0" encoding="utf-8"?>
+<p:sld xmlns:a="http://schemas.openxmlformats.org/drawingml/2006/main" xmlns:r="http://schemas.openxmlformats.org/officeDocument/2006/relationships" xmlns:p="http://schemas.openxmlformats.org/presentationml/2006/main">
+  <p:cSld>
+    <p:spTree>
+      <p:nvGrpSpPr>
+        <p:cNvPr id="1" name=""/>
+        <p:cNvGrpSpPr/>
+        <p:nvPr/>
+      </p:nvGrpSpPr>
+      <p:grpSpPr>
+        <a:xfrm>
+          <a:off x="0" y="0"/>
+          <a:ext cx="0" cy="0"/>
+          <a:chOff x="0" y="0"/>
+          <a:chExt cx="0" cy="0"/>
+        </a:xfrm>
+      </p:grpSpPr>
+      <p:sp>
+        <p:nvSpPr>
           <p:cNvPr id="3" name="Text Placeholder 2"/>
           <p:cNvSpPr>
             <a:spLocks noGrp="1"/>
@@ -7077,7 +7290,7 @@
               <a:pPr>
                 <a:defRPr/>
               </a:pPr>
-              <a:t>5</a:t>
+              <a:t>6</a:t>
             </a:fld>
             <a:endParaRPr lang="en-US" dirty="0"/>
           </a:p>

</xml_diff>